<commit_message>
Update notes re attendance
</commit_message>
<xml_diff>
--- a/Week 1/BAIM 3220_ Introductions and Course Expectations.pptx
+++ b/Week 1/BAIM 3220_ Introductions and Course Expectations.pptx
@@ -246,7 +246,7 @@
           <a:p>
             <a:fld id="{01469554-0319-46E7-8996-FC19A92B166E}" type="datetimeFigureOut">
               <a:rPr lang="en-US" smtClean="0"/>
-              <a:t>1/10/2021</a:t>
+              <a:t>1/14/2021</a:t>
             </a:fld>
             <a:endParaRPr lang="en-US"/>
           </a:p>
@@ -2664,16 +2664,18 @@
           <a:p>
             <a:pPr lvl="0"/>
             <a:r>
-              <a:rPr lang="en-US" dirty="0"/>
-              <a:t>Course Zoom Chat Channel</a:t>
-            </a:r>
+              <a:rPr lang="en-US" dirty="0" smtClean="0"/>
+              <a:t>Canvas discussions</a:t>
+            </a:r>
+            <a:endParaRPr lang="en-US" dirty="0"/>
           </a:p>
           <a:p>
             <a:pPr lvl="1"/>
             <a:r>
-              <a:rPr lang="en-US" dirty="0"/>
-              <a:t>Search the chat channels on Zoom for  “BAIM  3220 Chat Channel” and join the channel</a:t>
-            </a:r>
+              <a:rPr lang="en-US" dirty="0" smtClean="0"/>
+              <a:t>Create a topic, respond in a thread, ask the question that other folks are thinking of…</a:t>
+            </a:r>
+            <a:endParaRPr lang="en-US" dirty="0"/>
           </a:p>
         </p:txBody>
       </p:sp>
@@ -4826,8 +4828,13 @@
             <a:pPr lvl="1"/>
             <a:r>
               <a:rPr lang="en-US" sz="1400" dirty="0"/>
-              <a:t>Also serves as evidence for attendance and participation</a:t>
-            </a:r>
+              <a:t>Also serves as evidence for </a:t>
+            </a:r>
+            <a:r>
+              <a:rPr lang="en-US" sz="1400" dirty="0" smtClean="0"/>
+              <a:t>participation</a:t>
+            </a:r>
+            <a:endParaRPr lang="en-US" sz="1400" dirty="0"/>
           </a:p>
           <a:p>
             <a:pPr lvl="0"/>
@@ -4847,8 +4854,13 @@
             <a:pPr lvl="1"/>
             <a:r>
               <a:rPr lang="en-US" sz="1400" dirty="0"/>
-              <a:t>Another way to show your participation and attendance</a:t>
-            </a:r>
+              <a:t>Another way to show your </a:t>
+            </a:r>
+            <a:r>
+              <a:rPr lang="en-US" sz="1400" dirty="0" smtClean="0"/>
+              <a:t>participation</a:t>
+            </a:r>
+            <a:endParaRPr lang="en-US" sz="1400" dirty="0"/>
           </a:p>
           <a:p>
             <a:pPr lvl="0"/>

</xml_diff>

<commit_message>
Update the slides for week 1
</commit_message>
<xml_diff>
--- a/Week 1/BAIM 3220_ Introductions and Course Expectations.pptx
+++ b/Week 1/BAIM 3220_ Introductions and Course Expectations.pptx
@@ -246,7 +246,7 @@
           <a:p>
             <a:fld id="{01469554-0319-46E7-8996-FC19A92B166E}" type="datetimeFigureOut">
               <a:rPr lang="en-US" smtClean="0"/>
-              <a:t>8/23/2021</a:t>
+              <a:t>1/6/2022</a:t>
             </a:fld>
             <a:endParaRPr lang="en-US"/>
           </a:p>
@@ -2556,7 +2556,7 @@
             <a:pPr lvl="0"/>
             <a:r>
               <a:rPr lang="en-US" dirty="0"/>
-              <a:t>Fall 2021</a:t>
+              <a:t>Spring 2022</a:t>
             </a:r>
           </a:p>
           <a:p>
@@ -2782,7 +2782,7 @@
               <a:rPr lang="en-US" dirty="0">
                 <a:sym typeface="Arial"/>
               </a:rPr>
-              <a:t>Missing a Quiz or an Exam must be pre-approved by the second week of class or fall under an excused absence  </a:t>
+              <a:t>Missing a Quiz or an Exam must be pre-approved by the third week of class or fall under an excused absence  </a:t>
             </a:r>
           </a:p>
           <a:p>
@@ -3078,14 +3078,21 @@
           <a:p>
             <a:r>
               <a:rPr lang="en-US" dirty="0"/>
-              <a:t>Pursuits</a:t>
+              <a:t>Profession</a:t>
             </a:r>
           </a:p>
           <a:p>
             <a:pPr lvl="1"/>
             <a:r>
               <a:rPr lang="en-US" dirty="0"/>
-              <a:t>Amateur Radio and electrical engineering; A 1965 Lincoln Convertible; Private Pilot; metal working; tinkering!</a:t>
+              <a:t>Software Engineering Team Manager</a:t>
+            </a:r>
+          </a:p>
+          <a:p>
+            <a:pPr lvl="1"/>
+            <a:r>
+              <a:rPr lang="en-US" dirty="0"/>
+              <a:t>CU Anschutz, Center for Health AI</a:t>
             </a:r>
           </a:p>
           <a:p>
@@ -3407,7 +3414,7 @@
                 <a:cs typeface="Arial" panose="020B0604020202020204" pitchFamily="34" charset="0"/>
                 <a:sym typeface="Calibri"/>
               </a:rPr>
-              <a:t>Plan on working in Slack, especially after the first four weeks passes</a:t>
+              <a:t>Plan on working in Slack, especially after the first two weeks passes</a:t>
             </a:r>
           </a:p>
           <a:p>
@@ -4353,14 +4360,14 @@
           <p:nvPr>
             <p:extLst>
               <p:ext uri="{D42A27DB-BD31-4B8C-83A1-F6EECF244321}">
-                <p14:modId xmlns:p14="http://schemas.microsoft.com/office/powerpoint/2010/main" val="579165876"/>
+                <p14:modId xmlns:p14="http://schemas.microsoft.com/office/powerpoint/2010/main" val="4081920674"/>
               </p:ext>
             </p:extLst>
           </p:nvPr>
         </p:nvGraphicFramePr>
         <p:xfrm>
           <a:off x="3112940" y="860494"/>
-          <a:ext cx="5551000" cy="2380364"/>
+          <a:ext cx="5551000" cy="1991774"/>
         </p:xfrm>
         <a:graphic>
           <a:graphicData uri="http://schemas.openxmlformats.org/drawingml/2006/table">
@@ -4567,10 +4574,10 @@
                         <a:buNone/>
                       </a:pPr>
                       <a:r>
-                        <a:rPr lang="en"/>
+                        <a:rPr lang="en" dirty="0"/>
                         <a:t>5%</a:t>
                       </a:r>
-                      <a:endParaRPr/>
+                      <a:endParaRPr dirty="0"/>
                     </a:p>
                   </a:txBody>
                   <a:tcPr marL="91425" marR="91425" marT="91425" marB="91425">
@@ -4631,7 +4638,7 @@
                       </a:pPr>
                       <a:r>
                         <a:rPr lang="en" dirty="0"/>
-                        <a:t>35%</a:t>
+                        <a:t>40%</a:t>
                       </a:r>
                       <a:endParaRPr dirty="0"/>
                     </a:p>
@@ -4749,58 +4756,6 @@
                   </a:ext>
                 </a:extLst>
               </a:tr>
-              <a:tr h="384325">
-                <a:tc>
-                  <a:txBody>
-                    <a:bodyPr/>
-                    <a:lstStyle/>
-                    <a:p>
-                      <a:pPr marL="0" lvl="0" indent="0" algn="l" rtl="0">
-                        <a:spcBef>
-                          <a:spcPts val="0"/>
-                        </a:spcBef>
-                        <a:spcAft>
-                          <a:spcPts val="0"/>
-                        </a:spcAft>
-                        <a:buNone/>
-                      </a:pPr>
-                      <a:r>
-                        <a:rPr lang="en-US" dirty="0"/>
-                        <a:t>Extras</a:t>
-                      </a:r>
-                      <a:endParaRPr dirty="0"/>
-                    </a:p>
-                  </a:txBody>
-                  <a:tcPr marL="91425" marR="91425" marT="91425" marB="91425"/>
-                </a:tc>
-                <a:tc>
-                  <a:txBody>
-                    <a:bodyPr/>
-                    <a:lstStyle/>
-                    <a:p>
-                      <a:pPr marL="0" lvl="0" indent="0" algn="l" rtl="0">
-                        <a:spcBef>
-                          <a:spcPts val="0"/>
-                        </a:spcBef>
-                        <a:spcAft>
-                          <a:spcPts val="0"/>
-                        </a:spcAft>
-                        <a:buNone/>
-                      </a:pPr>
-                      <a:r>
-                        <a:rPr lang="en" dirty="0"/>
-                        <a:t>5%</a:t>
-                      </a:r>
-                    </a:p>
-                  </a:txBody>
-                  <a:tcPr marL="91425" marR="91425" marT="91425" marB="91425"/>
-                </a:tc>
-                <a:extLst>
-                  <a:ext uri="{0D108BD9-81ED-4DB2-BD59-A6C34878D82A}">
-                    <a16:rowId xmlns:a16="http://schemas.microsoft.com/office/drawing/2014/main" val="2275362655"/>
-                  </a:ext>
-                </a:extLst>
-              </a:tr>
             </a:tbl>
           </a:graphicData>
         </a:graphic>
@@ -4918,7 +4873,7 @@
             <a:pPr lvl="0"/>
             <a:r>
               <a:rPr lang="en-US" sz="1800" dirty="0"/>
-              <a:t>Note: up to three total practice exercises will be dropped. So if you miss a class and the in-class exercise for that day, that would count as one of your dropped practice exercises. </a:t>
+              <a:t>Note: up to three total practice exercises will be dropped. If you miss a class and the in-class exercise for that day, that counts as one of your dropped practice exercises. </a:t>
             </a:r>
           </a:p>
         </p:txBody>
@@ -5018,6 +4973,13 @@
             <a:r>
               <a:rPr lang="en-US" dirty="0"/>
               <a:t>Open-resources (incl. Internet, but no humans)</a:t>
+            </a:r>
+          </a:p>
+          <a:p>
+            <a:pPr lvl="1"/>
+            <a:r>
+              <a:rPr lang="en-US" dirty="0"/>
+              <a:t>Cite your work!</a:t>
             </a:r>
           </a:p>
           <a:p>

</xml_diff>